<commit_message>
Adding micrium installation file
</commit_message>
<xml_diff>
--- a/Módulos/PPT_base.pptx
+++ b/Módulos/PPT_base.pptx
@@ -198,7 +198,7 @@
           <a:p>
             <a:fld id="{737F50AA-F66A-F140-99DA-9F4EA1F18879}" type="datetimeFigureOut">
               <a:rPr lang="en-PT" smtClean="0"/>
-              <a:t>02/13/2022</a:t>
+              <a:t>02/19/2022</a:t>
             </a:fld>
             <a:endParaRPr lang="en-PT"/>
           </a:p>
@@ -620,7 +620,7 @@
           <a:p>
             <a:fld id="{4DA6A862-A0BD-0448-A2BF-24882E79AE8A}" type="datetime1">
               <a:rPr lang="en-US" smtClean="0"/>
-              <a:t>2/13/2022</a:t>
+              <a:t>2/19/2022</a:t>
             </a:fld>
             <a:endParaRPr lang="en-PT"/>
           </a:p>
@@ -947,7 +947,7 @@
           <a:p>
             <a:fld id="{EC90EF81-47A6-A145-A571-CAE5B9DF7575}" type="datetime1">
               <a:rPr lang="en-US" smtClean="0"/>
-              <a:t>2/13/2022</a:t>
+              <a:t>2/19/2022</a:t>
             </a:fld>
             <a:endParaRPr lang="en-PT"/>
           </a:p>
@@ -1157,7 +1157,7 @@
           <a:p>
             <a:fld id="{0A85ADAA-C944-CB49-96F4-487EF10BBB3C}" type="datetime1">
               <a:rPr lang="en-US" smtClean="0"/>
-              <a:t>2/13/2022</a:t>
+              <a:t>2/19/2022</a:t>
             </a:fld>
             <a:endParaRPr lang="en-PT"/>
           </a:p>
@@ -1305,7 +1305,7 @@
           <a:p>
             <a:fld id="{4DA6A862-A0BD-0448-A2BF-24882E79AE8A}" type="datetime1">
               <a:rPr lang="en-US" smtClean="0"/>
-              <a:t>2/13/2022</a:t>
+              <a:t>2/19/2022</a:t>
             </a:fld>
             <a:endParaRPr lang="en-PT" dirty="0"/>
           </a:p>
@@ -1738,7 +1738,7 @@
           <a:p>
             <a:fld id="{8C44AE3F-0196-E945-9ABE-FAEFF2AA0B7D}" type="datetime1">
               <a:rPr lang="en-US" smtClean="0"/>
-              <a:t>2/13/2022</a:t>
+              <a:t>2/19/2022</a:t>
             </a:fld>
             <a:endParaRPr lang="en-PT"/>
           </a:p>
@@ -1822,36 +1822,12 @@
           <a:p>
             <a:pPr algn="l"/>
             <a:r>
-              <a:rPr lang="en-GB" sz="1600" dirty="0" err="1">
+              <a:rPr lang="en-GB" sz="1600" dirty="0">
                 <a:solidFill>
                   <a:schemeClr val="tx1"/>
                 </a:solidFill>
               </a:rPr>
-              <a:t>Sistemas</a:t>
-            </a:r>
-            <a:r>
-              <a:rPr lang="en-GB" sz="1600" dirty="0">
-                <a:solidFill>
-                  <a:schemeClr val="tx1"/>
-                </a:solidFill>
-              </a:rPr>
-              <a:t> </a:t>
-            </a:r>
-            <a:r>
-              <a:rPr lang="en-GB" sz="1600" dirty="0" err="1">
-                <a:solidFill>
-                  <a:schemeClr val="tx1"/>
-                </a:solidFill>
-              </a:rPr>
-              <a:t>Embebidos</a:t>
-            </a:r>
-            <a:r>
-              <a:rPr lang="en-GB" sz="1600" dirty="0">
-                <a:solidFill>
-                  <a:schemeClr val="tx1"/>
-                </a:solidFill>
-              </a:rPr>
-              <a:t> LETI-SISEM </a:t>
+              <a:t>LETI-SISEM </a:t>
             </a:r>
           </a:p>
         </p:txBody>
@@ -2192,7 +2168,7 @@
           <a:p>
             <a:fld id="{09C521A8-1606-7641-9665-0CB37380A930}" type="datetime1">
               <a:rPr lang="en-US" smtClean="0"/>
-              <a:t>2/13/2022</a:t>
+              <a:t>2/19/2022</a:t>
             </a:fld>
             <a:endParaRPr lang="en-PT"/>
           </a:p>
@@ -2460,7 +2436,7 @@
           <a:p>
             <a:fld id="{586E45F3-B2C0-3F45-B0CD-00D0E427E12F}" type="datetime1">
               <a:rPr lang="en-US" smtClean="0"/>
-              <a:t>2/13/2022</a:t>
+              <a:t>2/19/2022</a:t>
             </a:fld>
             <a:endParaRPr lang="en-PT"/>
           </a:p>
@@ -2875,7 +2851,7 @@
           <a:p>
             <a:fld id="{50DB358B-7B2D-304F-86AF-6C469DE3272B}" type="datetime1">
               <a:rPr lang="en-US" smtClean="0"/>
-              <a:t>2/13/2022</a:t>
+              <a:t>2/19/2022</a:t>
             </a:fld>
             <a:endParaRPr lang="en-PT"/>
           </a:p>
@@ -3017,7 +2993,7 @@
           <a:p>
             <a:fld id="{4CEA7D64-3BDD-8D40-AC7E-47A6473BD88D}" type="datetime1">
               <a:rPr lang="en-US" smtClean="0"/>
-              <a:t>2/13/2022</a:t>
+              <a:t>2/19/2022</a:t>
             </a:fld>
             <a:endParaRPr lang="en-PT"/>
           </a:p>
@@ -3130,7 +3106,7 @@
           <a:p>
             <a:fld id="{0E199AC2-837D-3A41-8A01-3B7A37BD91B2}" type="datetime1">
               <a:rPr lang="en-US" smtClean="0"/>
-              <a:t>2/13/2022</a:t>
+              <a:t>2/19/2022</a:t>
             </a:fld>
             <a:endParaRPr lang="en-PT"/>
           </a:p>
@@ -3443,7 +3419,7 @@
           <a:p>
             <a:fld id="{DB9B3FF7-18D7-4E49-BA9B-999A5CE13360}" type="datetime1">
               <a:rPr lang="en-US" smtClean="0"/>
-              <a:t>2/13/2022</a:t>
+              <a:t>2/19/2022</a:t>
             </a:fld>
             <a:endParaRPr lang="en-PT"/>
           </a:p>
@@ -3732,7 +3708,7 @@
           <a:p>
             <a:fld id="{21A377E7-49D3-0243-A4F5-467C6740CC84}" type="datetime1">
               <a:rPr lang="en-US" smtClean="0"/>
-              <a:t>2/13/2022</a:t>
+              <a:t>2/19/2022</a:t>
             </a:fld>
             <a:endParaRPr lang="en-PT"/>
           </a:p>
@@ -3975,7 +3951,7 @@
           <a:p>
             <a:fld id="{A4924460-C01E-5845-8192-68E9E5A059DE}" type="datetime1">
               <a:rPr lang="en-US" smtClean="0"/>
-              <a:t>2/13/2022</a:t>
+              <a:t>2/19/2022</a:t>
             </a:fld>
             <a:endParaRPr lang="en-PT"/>
           </a:p>

</xml_diff>